<commit_message>
aanpassing aan de presentatie
</commit_message>
<xml_diff>
--- a/presentatie/CASE.pptx
+++ b/presentatie/CASE.pptx
@@ -112,7 +112,162 @@
       </a:defRPr>
     </a:lvl9pPr>
   </p:defaultTextStyle>
+  <p:extLst>
+    <p:ext uri="{EFAFB233-063F-42B5-8137-9DF3F51BA10A}">
+      <p15:sldGuideLst xmlns:p15="http://schemas.microsoft.com/office/powerpoint/2012/main"/>
+    </p:ext>
+  </p:extLst>
 </p:presentation>
+</file>
+
+<file path=ppt/revisionInfo.xml><?xml version="1.0" encoding="utf-8"?>
+<p1510:revInfo xmlns:a="http://schemas.openxmlformats.org/drawingml/2006/main" xmlns:r="http://schemas.openxmlformats.org/officeDocument/2006/relationships" xmlns:p1510="http://schemas.microsoft.com/office/powerpoint/2015/10/main">
+  <p1510:revLst>
+    <p1510:client id="{9B45DCD1-FD93-44E4-A98B-C1BDC568E7A8}" v="319" dt="2025-12-11T16:04:08.334"/>
+  </p1510:revLst>
+</p1510:revInfo>
+</file>
+
+<file path=ppt/changesInfos/changesInfo1.xml><?xml version="1.0" encoding="utf-8"?>
+<pc:chgInfo xmlns:a="http://schemas.openxmlformats.org/drawingml/2006/main" xmlns:r="http://schemas.openxmlformats.org/officeDocument/2006/relationships" xmlns:ac="http://schemas.microsoft.com/office/drawing/2013/main/command" xmlns:pc="http://schemas.microsoft.com/office/powerpoint/2013/main/command">
+  <pc:docChgLst>
+    <pc:chgData name="Ziggy Verboven" userId="472a71a4e74e1ad2" providerId="Windows Live" clId="Web-{9B45DCD1-FD93-44E4-A98B-C1BDC568E7A8}"/>
+    <pc:docChg chg="modSld">
+      <pc:chgData name="Ziggy Verboven" userId="472a71a4e74e1ad2" providerId="Windows Live" clId="Web-{9B45DCD1-FD93-44E4-A98B-C1BDC568E7A8}" dt="2025-12-11T16:04:08.334" v="320" actId="20577"/>
+      <pc:docMkLst>
+        <pc:docMk/>
+      </pc:docMkLst>
+      <pc:sldChg chg="modSp">
+        <pc:chgData name="Ziggy Verboven" userId="472a71a4e74e1ad2" providerId="Windows Live" clId="Web-{9B45DCD1-FD93-44E4-A98B-C1BDC568E7A8}" dt="2025-12-11T15:34:59.303" v="133" actId="20577"/>
+        <pc:sldMkLst>
+          <pc:docMk/>
+          <pc:sldMk cId="401264868" sldId="257"/>
+        </pc:sldMkLst>
+        <pc:spChg chg="mod">
+          <ac:chgData name="Ziggy Verboven" userId="472a71a4e74e1ad2" providerId="Windows Live" clId="Web-{9B45DCD1-FD93-44E4-A98B-C1BDC568E7A8}" dt="2025-12-11T15:34:59.303" v="133" actId="20577"/>
+          <ac:spMkLst>
+            <pc:docMk/>
+            <pc:sldMk cId="401264868" sldId="257"/>
+            <ac:spMk id="3" creationId="{2C4B0FC0-5FAF-66AE-601B-F1BAB6FA766F}"/>
+          </ac:spMkLst>
+        </pc:spChg>
+      </pc:sldChg>
+      <pc:sldChg chg="modSp">
+        <pc:chgData name="Ziggy Verboven" userId="472a71a4e74e1ad2" providerId="Windows Live" clId="Web-{9B45DCD1-FD93-44E4-A98B-C1BDC568E7A8}" dt="2025-12-11T16:04:08.334" v="320" actId="20577"/>
+        <pc:sldMkLst>
+          <pc:docMk/>
+          <pc:sldMk cId="672993214" sldId="258"/>
+        </pc:sldMkLst>
+        <pc:spChg chg="mod">
+          <ac:chgData name="Ziggy Verboven" userId="472a71a4e74e1ad2" providerId="Windows Live" clId="Web-{9B45DCD1-FD93-44E4-A98B-C1BDC568E7A8}" dt="2025-12-11T16:04:08.334" v="320" actId="20577"/>
+          <ac:spMkLst>
+            <pc:docMk/>
+            <pc:sldMk cId="672993214" sldId="258"/>
+            <ac:spMk id="3" creationId="{7F1C7C0B-3A84-333E-B934-13DF52FC7225}"/>
+          </ac:spMkLst>
+        </pc:spChg>
+      </pc:sldChg>
+      <pc:sldChg chg="modSp">
+        <pc:chgData name="Ziggy Verboven" userId="472a71a4e74e1ad2" providerId="Windows Live" clId="Web-{9B45DCD1-FD93-44E4-A98B-C1BDC568E7A8}" dt="2025-12-11T16:03:48.022" v="318" actId="14100"/>
+        <pc:sldMkLst>
+          <pc:docMk/>
+          <pc:sldMk cId="3838526339" sldId="259"/>
+        </pc:sldMkLst>
+        <pc:spChg chg="mod">
+          <ac:chgData name="Ziggy Verboven" userId="472a71a4e74e1ad2" providerId="Windows Live" clId="Web-{9B45DCD1-FD93-44E4-A98B-C1BDC568E7A8}" dt="2025-12-11T16:03:48.022" v="318" actId="14100"/>
+          <ac:spMkLst>
+            <pc:docMk/>
+            <pc:sldMk cId="3838526339" sldId="259"/>
+            <ac:spMk id="3" creationId="{05912A0E-CC01-293D-3487-400E82AD229E}"/>
+          </ac:spMkLst>
+        </pc:spChg>
+      </pc:sldChg>
+      <pc:sldChg chg="modSp">
+        <pc:chgData name="Ziggy Verboven" userId="472a71a4e74e1ad2" providerId="Windows Live" clId="Web-{9B45DCD1-FD93-44E4-A98B-C1BDC568E7A8}" dt="2025-12-11T16:03:27.693" v="313" actId="20577"/>
+        <pc:sldMkLst>
+          <pc:docMk/>
+          <pc:sldMk cId="1962035413" sldId="260"/>
+        </pc:sldMkLst>
+        <pc:spChg chg="mod">
+          <ac:chgData name="Ziggy Verboven" userId="472a71a4e74e1ad2" providerId="Windows Live" clId="Web-{9B45DCD1-FD93-44E4-A98B-C1BDC568E7A8}" dt="2025-12-11T16:03:27.693" v="313" actId="20577"/>
+          <ac:spMkLst>
+            <pc:docMk/>
+            <pc:sldMk cId="1962035413" sldId="260"/>
+            <ac:spMk id="3" creationId="{7092B6BE-91ED-24A4-15A0-05B6F10C7F77}"/>
+          </ac:spMkLst>
+        </pc:spChg>
+      </pc:sldChg>
+      <pc:sldChg chg="modSp">
+        <pc:chgData name="Ziggy Verboven" userId="472a71a4e74e1ad2" providerId="Windows Live" clId="Web-{9B45DCD1-FD93-44E4-A98B-C1BDC568E7A8}" dt="2025-12-11T16:03:33.162" v="314" actId="20577"/>
+        <pc:sldMkLst>
+          <pc:docMk/>
+          <pc:sldMk cId="70336122" sldId="261"/>
+        </pc:sldMkLst>
+        <pc:spChg chg="mod">
+          <ac:chgData name="Ziggy Verboven" userId="472a71a4e74e1ad2" providerId="Windows Live" clId="Web-{9B45DCD1-FD93-44E4-A98B-C1BDC568E7A8}" dt="2025-12-11T16:03:33.162" v="314" actId="20577"/>
+          <ac:spMkLst>
+            <pc:docMk/>
+            <pc:sldMk cId="70336122" sldId="261"/>
+            <ac:spMk id="3" creationId="{EF63539A-1A87-7D9E-69BE-B8DBF8E35DCC}"/>
+          </ac:spMkLst>
+        </pc:spChg>
+      </pc:sldChg>
+      <pc:sldChg chg="modSp">
+        <pc:chgData name="Ziggy Verboven" userId="472a71a4e74e1ad2" providerId="Windows Live" clId="Web-{9B45DCD1-FD93-44E4-A98B-C1BDC568E7A8}" dt="2025-12-11T16:03:13.303" v="310" actId="20577"/>
+        <pc:sldMkLst>
+          <pc:docMk/>
+          <pc:sldMk cId="2646111747" sldId="262"/>
+        </pc:sldMkLst>
+        <pc:spChg chg="mod">
+          <ac:chgData name="Ziggy Verboven" userId="472a71a4e74e1ad2" providerId="Windows Live" clId="Web-{9B45DCD1-FD93-44E4-A98B-C1BDC568E7A8}" dt="2025-12-11T16:03:13.303" v="310" actId="20577"/>
+          <ac:spMkLst>
+            <pc:docMk/>
+            <pc:sldMk cId="2646111747" sldId="262"/>
+            <ac:spMk id="3" creationId="{0F7A054C-99BC-446C-3095-1232CC2B3230}"/>
+          </ac:spMkLst>
+        </pc:spChg>
+      </pc:sldChg>
+      <pc:sldChg chg="modSp">
+        <pc:chgData name="Ziggy Verboven" userId="472a71a4e74e1ad2" providerId="Windows Live" clId="Web-{9B45DCD1-FD93-44E4-A98B-C1BDC568E7A8}" dt="2025-12-11T16:03:07.896" v="309" actId="20577"/>
+        <pc:sldMkLst>
+          <pc:docMk/>
+          <pc:sldMk cId="698693725" sldId="263"/>
+        </pc:sldMkLst>
+        <pc:spChg chg="mod">
+          <ac:chgData name="Ziggy Verboven" userId="472a71a4e74e1ad2" providerId="Windows Live" clId="Web-{9B45DCD1-FD93-44E4-A98B-C1BDC568E7A8}" dt="2025-12-11T16:03:07.896" v="309" actId="20577"/>
+          <ac:spMkLst>
+            <pc:docMk/>
+            <pc:sldMk cId="698693725" sldId="263"/>
+            <ac:spMk id="3" creationId="{7D881B9B-72F8-0A9E-1192-FC572570AD67}"/>
+          </ac:spMkLst>
+        </pc:spChg>
+      </pc:sldChg>
+      <pc:sldChg chg="modSp">
+        <pc:chgData name="Ziggy Verboven" userId="472a71a4e74e1ad2" providerId="Windows Live" clId="Web-{9B45DCD1-FD93-44E4-A98B-C1BDC568E7A8}" dt="2025-12-11T16:03:03.943" v="308" actId="20577"/>
+        <pc:sldMkLst>
+          <pc:docMk/>
+          <pc:sldMk cId="1298428532" sldId="264"/>
+        </pc:sldMkLst>
+        <pc:spChg chg="mod">
+          <ac:chgData name="Ziggy Verboven" userId="472a71a4e74e1ad2" providerId="Windows Live" clId="Web-{9B45DCD1-FD93-44E4-A98B-C1BDC568E7A8}" dt="2025-12-11T16:03:03.943" v="308" actId="20577"/>
+          <ac:spMkLst>
+            <pc:docMk/>
+            <pc:sldMk cId="1298428532" sldId="264"/>
+            <ac:spMk id="3" creationId="{A609AF3E-C814-9F91-FE57-EBCFDF6482AB}"/>
+          </ac:spMkLst>
+        </pc:spChg>
+        <pc:picChg chg="mod">
+          <ac:chgData name="Ziggy Verboven" userId="472a71a4e74e1ad2" providerId="Windows Live" clId="Web-{9B45DCD1-FD93-44E4-A98B-C1BDC568E7A8}" dt="2025-12-11T16:02:56.037" v="305" actId="1076"/>
+          <ac:picMkLst>
+            <pc:docMk/>
+            <pc:sldMk cId="1298428532" sldId="264"/>
+            <ac:picMk id="7" creationId="{C296C885-3288-DB2A-F6FE-6727EA500864}"/>
+          </ac:picMkLst>
+        </pc:picChg>
+      </pc:sldChg>
+    </pc:docChg>
+  </pc:docChgLst>
+</pc:chgInfo>
 </file>
 
 <file path=ppt/slideLayouts/slideLayout1.xml><?xml version="1.0" encoding="utf-8"?>
@@ -318,7 +473,7 @@
           <a:p>
             <a:fld id="{8DB093D9-518A-45F2-B7C5-14FF0DAA0A99}" type="slidenum">
               <a:rPr lang="nl-BE" smtClean="0"/>
-              <a:t>‹nr.›</a:t>
+              <a:t>‹#›</a:t>
             </a:fld>
             <a:endParaRPr lang="nl-BE"/>
           </a:p>
@@ -518,7 +673,7 @@
           <a:p>
             <a:fld id="{8DB093D9-518A-45F2-B7C5-14FF0DAA0A99}" type="slidenum">
               <a:rPr lang="nl-BE" smtClean="0"/>
-              <a:t>‹nr.›</a:t>
+              <a:t>‹#›</a:t>
             </a:fld>
             <a:endParaRPr lang="nl-BE"/>
           </a:p>
@@ -728,7 +883,7 @@
           <a:p>
             <a:fld id="{8DB093D9-518A-45F2-B7C5-14FF0DAA0A99}" type="slidenum">
               <a:rPr lang="nl-BE" smtClean="0"/>
-              <a:t>‹nr.›</a:t>
+              <a:t>‹#›</a:t>
             </a:fld>
             <a:endParaRPr lang="nl-BE"/>
           </a:p>
@@ -928,7 +1083,7 @@
           <a:p>
             <a:fld id="{8DB093D9-518A-45F2-B7C5-14FF0DAA0A99}" type="slidenum">
               <a:rPr lang="nl-BE" smtClean="0"/>
-              <a:t>‹nr.›</a:t>
+              <a:t>‹#›</a:t>
             </a:fld>
             <a:endParaRPr lang="nl-BE"/>
           </a:p>
@@ -1204,7 +1359,7 @@
           <a:p>
             <a:fld id="{8DB093D9-518A-45F2-B7C5-14FF0DAA0A99}" type="slidenum">
               <a:rPr lang="nl-BE" smtClean="0"/>
-              <a:t>‹nr.›</a:t>
+              <a:t>‹#›</a:t>
             </a:fld>
             <a:endParaRPr lang="nl-BE"/>
           </a:p>
@@ -1472,7 +1627,7 @@
           <a:p>
             <a:fld id="{8DB093D9-518A-45F2-B7C5-14FF0DAA0A99}" type="slidenum">
               <a:rPr lang="nl-BE" smtClean="0"/>
-              <a:t>‹nr.›</a:t>
+              <a:t>‹#›</a:t>
             </a:fld>
             <a:endParaRPr lang="nl-BE"/>
           </a:p>
@@ -1887,7 +2042,7 @@
           <a:p>
             <a:fld id="{8DB093D9-518A-45F2-B7C5-14FF0DAA0A99}" type="slidenum">
               <a:rPr lang="nl-BE" smtClean="0"/>
-              <a:t>‹nr.›</a:t>
+              <a:t>‹#›</a:t>
             </a:fld>
             <a:endParaRPr lang="nl-BE"/>
           </a:p>
@@ -2029,7 +2184,7 @@
           <a:p>
             <a:fld id="{8DB093D9-518A-45F2-B7C5-14FF0DAA0A99}" type="slidenum">
               <a:rPr lang="nl-BE" smtClean="0"/>
-              <a:t>‹nr.›</a:t>
+              <a:t>‹#›</a:t>
             </a:fld>
             <a:endParaRPr lang="nl-BE"/>
           </a:p>
@@ -2142,7 +2297,7 @@
           <a:p>
             <a:fld id="{8DB093D9-518A-45F2-B7C5-14FF0DAA0A99}" type="slidenum">
               <a:rPr lang="nl-BE" smtClean="0"/>
-              <a:t>‹nr.›</a:t>
+              <a:t>‹#›</a:t>
             </a:fld>
             <a:endParaRPr lang="nl-BE"/>
           </a:p>
@@ -2455,7 +2610,7 @@
           <a:p>
             <a:fld id="{8DB093D9-518A-45F2-B7C5-14FF0DAA0A99}" type="slidenum">
               <a:rPr lang="nl-BE" smtClean="0"/>
-              <a:t>‹nr.›</a:t>
+              <a:t>‹#›</a:t>
             </a:fld>
             <a:endParaRPr lang="nl-BE"/>
           </a:p>
@@ -2744,7 +2899,7 @@
           <a:p>
             <a:fld id="{8DB093D9-518A-45F2-B7C5-14FF0DAA0A99}" type="slidenum">
               <a:rPr lang="nl-BE" smtClean="0"/>
-              <a:t>‹nr.›</a:t>
+              <a:t>‹#›</a:t>
             </a:fld>
             <a:endParaRPr lang="nl-BE"/>
           </a:p>
@@ -3023,7 +3178,7 @@
           <a:p>
             <a:fld id="{8DB093D9-518A-45F2-B7C5-14FF0DAA0A99}" type="slidenum">
               <a:rPr lang="nl-BE" smtClean="0"/>
-              <a:t>‹nr.›</a:t>
+              <a:t>‹#›</a:t>
             </a:fld>
             <a:endParaRPr lang="nl-BE"/>
           </a:p>
@@ -3511,7 +3666,7 @@
         <p:spPr>
           <a:xfrm>
             <a:off x="838200" y="1825625"/>
-            <a:ext cx="4988626" cy="4351338"/>
+            <a:ext cx="5115626" cy="4351338"/>
           </a:xfrm>
         </p:spPr>
         <p:txBody>
@@ -3520,13 +3675,108 @@
           </a:bodyPr>
           <a:lstStyle/>
           <a:p>
+            <a:pPr>
+              <a:buFont typeface="Arial"/>
+              <a:buChar char="•"/>
+            </a:pPr>
+            <a:r>
+              <a:rPr lang="nl-BE" sz="2000" dirty="0">
+                <a:ea typeface="+mn-lt"/>
+                <a:cs typeface="+mn-lt"/>
+              </a:rPr>
+              <a:t>Start van de case.</a:t>
+            </a:r>
+            <a:endParaRPr lang="en-US"/>
+          </a:p>
+          <a:p>
+            <a:pPr>
+              <a:buFont typeface="Arial"/>
+              <a:buChar char="•"/>
+            </a:pPr>
+            <a:r>
+              <a:rPr lang="nl-BE" sz="2000" dirty="0">
+                <a:ea typeface="+mn-lt"/>
+                <a:cs typeface="+mn-lt"/>
+              </a:rPr>
+              <a:t>Brainstorm over mogelijke concepten.</a:t>
+            </a:r>
+            <a:endParaRPr lang="nl-BE"/>
+          </a:p>
+          <a:p>
+            <a:pPr>
+              <a:buFont typeface="Arial"/>
+              <a:buChar char="•"/>
+            </a:pPr>
+            <a:r>
+              <a:rPr lang="nl-BE" sz="2000" dirty="0">
+                <a:ea typeface="+mn-lt"/>
+                <a:cs typeface="+mn-lt"/>
+              </a:rPr>
+              <a:t>Definitieve keuze maken was lastig.</a:t>
+            </a:r>
+            <a:endParaRPr lang="nl-BE"/>
+          </a:p>
+          <a:p>
+            <a:pPr>
+              <a:buFont typeface="Arial"/>
+              <a:buChar char="•"/>
+            </a:pPr>
+            <a:r>
+              <a:rPr lang="nl-BE" sz="2000" dirty="0">
+                <a:ea typeface="+mn-lt"/>
+                <a:cs typeface="+mn-lt"/>
+              </a:rPr>
+              <a:t>Even afstand nemen.</a:t>
+            </a:r>
+            <a:endParaRPr lang="nl-BE" sz="2000"/>
+          </a:p>
+          <a:p>
+            <a:pPr>
+              <a:buFont typeface="Arial"/>
+              <a:buChar char="•"/>
+            </a:pPr>
+            <a:r>
+              <a:rPr lang="nl-BE" sz="2000" dirty="0">
+                <a:ea typeface="+mn-lt"/>
+                <a:cs typeface="+mn-lt"/>
+              </a:rPr>
+              <a:t>Thuis nagedacht over ideeën.</a:t>
+            </a:r>
+            <a:endParaRPr lang="nl-BE"/>
+          </a:p>
+          <a:p>
+            <a:pPr>
+              <a:buFont typeface="Arial"/>
+              <a:buChar char="•"/>
+            </a:pPr>
+            <a:r>
+              <a:rPr lang="nl-BE" sz="2000" dirty="0">
+                <a:ea typeface="+mn-lt"/>
+                <a:cs typeface="+mn-lt"/>
+              </a:rPr>
+              <a:t>Thuis top 3 concepten.</a:t>
+            </a:r>
+            <a:endParaRPr lang="nl-BE"/>
+          </a:p>
+          <a:p>
+            <a:pPr>
+              <a:buFont typeface="Arial"/>
+              <a:buChar char="•"/>
+            </a:pPr>
+            <a:r>
+              <a:rPr lang="nl-BE" sz="2000" dirty="0">
+                <a:ea typeface="+mn-lt"/>
+                <a:cs typeface="+mn-lt"/>
+              </a:rPr>
+              <a:t>Volgende dag konden we gerichter  werken.</a:t>
+            </a:r>
+            <a:endParaRPr lang="nl-BE"/>
+          </a:p>
+          <a:p>
             <a:pPr marL="0" indent="0">
               <a:buNone/>
             </a:pPr>
-            <a:r>
-              <a:rPr lang="nl-BE" sz="2000" dirty="0"/>
-              <a:t>Op dag 1 zijn we gestart met de case door eerst te brainstormen over welke soort horecagelegenheid we wilden uitwerken. We merkten al snel dat het moeilijk was om een definitieve keuze te maken, omdat we verschillende richtingen overwogen. Na een periode van twijfelen besloten we het even te laten rusten. Thuis hebben we elk individueel verder nagedacht en een persoonlijke top 3 opgesteld van mogelijke concepten. Op die manier konden we de volgende dag gerichter verder te werken aan de case.</a:t>
-            </a:r>
+            <a:endParaRPr lang="nl-BE" sz="2000" dirty="0"/>
           </a:p>
         </p:txBody>
       </p:sp>
@@ -3754,70 +4004,187 @@
           </a:bodyPr>
           <a:lstStyle/>
           <a:p>
-            <a:pPr marL="0" indent="0">
-              <a:buNone/>
+            <a:pPr>
+              <a:buFont typeface="Arial"/>
+              <a:buChar char="•"/>
             </a:pPr>
             <a:r>
-              <a:rPr lang="nl-BE" sz="2000" dirty="0"/>
-              <a:t>Op dag 2 zijn we op school opnieuw samengekomen om de top 3 van iedere persoon in de groep te bespreken. Tijdens deze bespreking kwamen we gezamenlijk tot de beslissing om te kiezen voor een </a:t>
-            </a:r>
-            <a:r>
-              <a:rPr lang="nl-BE" sz="2000" i="1" dirty="0" err="1"/>
+              <a:rPr lang="nl-BE" sz="2000" dirty="0">
+                <a:ea typeface="+mn-lt"/>
+                <a:cs typeface="+mn-lt"/>
+              </a:rPr>
+              <a:t>Dag 2 bespreken we elkaars top 3.</a:t>
+            </a:r>
+            <a:endParaRPr lang="en-US">
+              <a:ea typeface="+mn-lt"/>
+              <a:cs typeface="+mn-lt"/>
+            </a:endParaRPr>
+          </a:p>
+          <a:p>
+            <a:pPr>
+              <a:buFont typeface="Arial"/>
+              <a:buChar char="•"/>
+            </a:pPr>
+            <a:r>
+              <a:rPr lang="nl-BE" sz="2000" dirty="0">
+                <a:ea typeface="+mn-lt"/>
+                <a:cs typeface="+mn-lt"/>
+              </a:rPr>
+              <a:t>We kiezen gezamenlijk voor een </a:t>
+            </a:r>
+            <a:r>
+              <a:rPr lang="nl-BE" sz="2000" dirty="0" err="1">
+                <a:ea typeface="+mn-lt"/>
+                <a:cs typeface="+mn-lt"/>
+              </a:rPr>
               <a:t>all</a:t>
             </a:r>
             <a:r>
-              <a:rPr lang="nl-BE" sz="2000" i="1" dirty="0"/>
+              <a:rPr lang="nl-BE" sz="2000" dirty="0">
+                <a:ea typeface="+mn-lt"/>
+                <a:cs typeface="+mn-lt"/>
+              </a:rPr>
               <a:t> </a:t>
             </a:r>
             <a:r>
-              <a:rPr lang="nl-BE" sz="2000" i="1" dirty="0" err="1"/>
+              <a:rPr lang="nl-BE" sz="2000" dirty="0" err="1">
+                <a:ea typeface="+mn-lt"/>
+                <a:cs typeface="+mn-lt"/>
+              </a:rPr>
               <a:t>you</a:t>
             </a:r>
             <a:r>
-              <a:rPr lang="nl-BE" sz="2000" i="1" dirty="0"/>
+              <a:rPr lang="nl-BE" sz="2000" dirty="0">
+                <a:ea typeface="+mn-lt"/>
+                <a:cs typeface="+mn-lt"/>
+              </a:rPr>
               <a:t> </a:t>
             </a:r>
             <a:r>
-              <a:rPr lang="nl-BE" sz="2000" i="1" dirty="0" err="1"/>
+              <a:rPr lang="nl-BE" sz="2000" dirty="0" err="1">
+                <a:ea typeface="+mn-lt"/>
+                <a:cs typeface="+mn-lt"/>
+              </a:rPr>
               <a:t>can</a:t>
             </a:r>
             <a:r>
-              <a:rPr lang="nl-BE" sz="2000" i="1" dirty="0"/>
+              <a:rPr lang="nl-BE" sz="2000" dirty="0">
+                <a:ea typeface="+mn-lt"/>
+                <a:cs typeface="+mn-lt"/>
+              </a:rPr>
               <a:t> </a:t>
             </a:r>
             <a:r>
-              <a:rPr lang="nl-BE" sz="2000" i="1" dirty="0" err="1"/>
+              <a:rPr lang="nl-BE" sz="2000" dirty="0" err="1">
+                <a:ea typeface="+mn-lt"/>
+                <a:cs typeface="+mn-lt"/>
+              </a:rPr>
               <a:t>eat</a:t>
             </a:r>
             <a:r>
-              <a:rPr lang="nl-BE" sz="2000" dirty="0"/>
-              <a:t>-restaurant als ons concept.</a:t>
-            </a:r>
-          </a:p>
-          <a:p>
-            <a:pPr marL="0" indent="0">
-              <a:buNone/>
+              <a:rPr lang="nl-BE" sz="2000" dirty="0">
+                <a:ea typeface="+mn-lt"/>
+                <a:cs typeface="+mn-lt"/>
+              </a:rPr>
+              <a:t>-restaurant..</a:t>
+            </a:r>
+            <a:endParaRPr lang="nl-BE">
+              <a:ea typeface="+mn-lt"/>
+              <a:cs typeface="+mn-lt"/>
+            </a:endParaRPr>
+          </a:p>
+          <a:p>
+            <a:pPr>
+              <a:buFont typeface="Arial"/>
+              <a:buChar char="•"/>
             </a:pPr>
             <a:r>
-              <a:rPr lang="nl-BE" sz="2000" dirty="0"/>
-              <a:t>Na het maken van deze keuze zijn we meteen begonnen met brainstormen over hoe onze website eruit zou moeten zien. Zodra we hierover een duidelijk beeld hadden, zijn we in </a:t>
-            </a:r>
-            <a:r>
-              <a:rPr lang="nl-BE" sz="2000" dirty="0" err="1"/>
+              <a:rPr lang="nl-BE" sz="2000" dirty="0">
+                <a:ea typeface="+mn-lt"/>
+                <a:cs typeface="+mn-lt"/>
+              </a:rPr>
+              <a:t>Starten met  brainstormen over de website.</a:t>
+            </a:r>
+            <a:endParaRPr lang="nl-BE">
+              <a:ea typeface="+mn-lt"/>
+              <a:cs typeface="+mn-lt"/>
+            </a:endParaRPr>
+          </a:p>
+          <a:p>
+            <a:pPr>
+              <a:buFont typeface="Arial"/>
+              <a:buChar char="•"/>
+            </a:pPr>
+            <a:r>
+              <a:rPr lang="nl-BE" sz="2000" dirty="0">
+                <a:ea typeface="+mn-lt"/>
+                <a:cs typeface="+mn-lt"/>
+              </a:rPr>
+              <a:t>Het concept wordt verder uitgewerkt tot een helder beeld.</a:t>
+            </a:r>
+            <a:endParaRPr lang="nl-BE"/>
+          </a:p>
+          <a:p>
+            <a:pPr>
+              <a:buFont typeface="Arial"/>
+              <a:buChar char="•"/>
+            </a:pPr>
+            <a:r>
+              <a:rPr lang="nl-BE" sz="2000" dirty="0">
+                <a:ea typeface="+mn-lt"/>
+                <a:cs typeface="+mn-lt"/>
+              </a:rPr>
+              <a:t>In </a:t>
+            </a:r>
+            <a:r>
+              <a:rPr lang="nl-BE" sz="2000" dirty="0" err="1">
+                <a:ea typeface="+mn-lt"/>
+                <a:cs typeface="+mn-lt"/>
+              </a:rPr>
               <a:t>Figma</a:t>
             </a:r>
             <a:r>
-              <a:rPr lang="nl-BE" sz="2000" dirty="0"/>
-              <a:t> aan de slag gegaan om de </a:t>
-            </a:r>
-            <a:r>
-              <a:rPr lang="nl-BE" sz="2000" dirty="0" err="1"/>
+              <a:rPr lang="nl-BE" sz="2000" dirty="0">
+                <a:ea typeface="+mn-lt"/>
+                <a:cs typeface="+mn-lt"/>
+              </a:rPr>
+              <a:t> wordt de </a:t>
+            </a:r>
+            <a:r>
+              <a:rPr lang="nl-BE" sz="2000" dirty="0" err="1">
+                <a:ea typeface="+mn-lt"/>
+                <a:cs typeface="+mn-lt"/>
+              </a:rPr>
               <a:t>wireframe</a:t>
             </a:r>
             <a:r>
-              <a:rPr lang="nl-BE" sz="2000" dirty="0"/>
-              <a:t> te ontwerpen. Tegen het einde van de dag was ons ontwerp volledig af.</a:t>
-            </a:r>
+              <a:rPr lang="nl-BE" sz="2000" dirty="0">
+                <a:ea typeface="+mn-lt"/>
+                <a:cs typeface="+mn-lt"/>
+              </a:rPr>
+              <a:t> ontworpen.</a:t>
+            </a:r>
+            <a:endParaRPr lang="nl-BE">
+              <a:ea typeface="+mn-lt"/>
+              <a:cs typeface="+mn-lt"/>
+            </a:endParaRPr>
+          </a:p>
+          <a:p>
+            <a:pPr>
+              <a:buFont typeface="Arial"/>
+              <a:buChar char="•"/>
+            </a:pPr>
+            <a:r>
+              <a:rPr lang="nl-BE" sz="2000" dirty="0">
+                <a:ea typeface="+mn-lt"/>
+                <a:cs typeface="+mn-lt"/>
+              </a:rPr>
+              <a:t>Aan het einde van de dag ligt het volledige ontwerp klaar.</a:t>
+            </a:r>
+            <a:endParaRPr lang="nl-BE">
+              <a:ea typeface="+mn-lt"/>
+              <a:cs typeface="+mn-lt"/>
+            </a:endParaRPr>
           </a:p>
           <a:p>
             <a:pPr marL="0" indent="0">
@@ -4046,8 +4413,8 @@
         </p:nvSpPr>
         <p:spPr>
           <a:xfrm>
-            <a:off x="838200" y="1592241"/>
-            <a:ext cx="9992096" cy="1325563"/>
+            <a:off x="2411046" y="1719241"/>
+            <a:ext cx="6279789" cy="1325563"/>
           </a:xfrm>
         </p:spPr>
         <p:txBody>
@@ -4056,29 +4423,90 @@
           </a:bodyPr>
           <a:lstStyle/>
           <a:p>
-            <a:pPr marL="0" indent="0">
-              <a:buNone/>
+            <a:pPr>
+              <a:buFont typeface="Arial"/>
+              <a:buChar char="•"/>
             </a:pPr>
             <a:r>
-              <a:rPr lang="nl-BE" sz="2000" dirty="0"/>
-              <a:t>Op dag 3 hebben we eerst enkele kleine aanpassingen aangebracht aan het </a:t>
-            </a:r>
-            <a:r>
-              <a:rPr lang="nl-BE" sz="2000" dirty="0" err="1"/>
+              <a:rPr lang="nl-BE" sz="2000" dirty="0">
+                <a:ea typeface="+mn-lt"/>
+                <a:cs typeface="+mn-lt"/>
+              </a:rPr>
+              <a:t>Dag 3: kleine verbeteringen aan het </a:t>
+            </a:r>
+            <a:r>
+              <a:rPr lang="nl-BE" sz="2000" err="1">
+                <a:ea typeface="+mn-lt"/>
+                <a:cs typeface="+mn-lt"/>
+              </a:rPr>
               <a:t>wireframe</a:t>
             </a:r>
             <a:r>
-              <a:rPr lang="nl-BE" sz="2000" dirty="0"/>
-              <a:t>. Nadat deze verbeteringen waren doorgevoerd, zijn we begonnen met het coderen van de navigatiebalk en de </a:t>
-            </a:r>
-            <a:r>
-              <a:rPr lang="nl-BE" sz="2000" dirty="0" err="1"/>
+              <a:rPr lang="nl-BE" sz="2000" dirty="0">
+                <a:ea typeface="+mn-lt"/>
+                <a:cs typeface="+mn-lt"/>
+              </a:rPr>
+              <a:t>.</a:t>
+            </a:r>
+            <a:endParaRPr lang="en-US">
+              <a:ea typeface="+mn-lt"/>
+              <a:cs typeface="+mn-lt"/>
+            </a:endParaRPr>
+          </a:p>
+          <a:p>
+            <a:pPr>
+              <a:buFont typeface="Arial"/>
+              <a:buChar char="•"/>
+            </a:pPr>
+            <a:r>
+              <a:rPr lang="nl-BE" sz="2000" dirty="0">
+                <a:ea typeface="+mn-lt"/>
+                <a:cs typeface="+mn-lt"/>
+              </a:rPr>
+              <a:t>Start met het coderen van de navigatiebalk en </a:t>
+            </a:r>
+            <a:r>
+              <a:rPr lang="nl-BE" sz="2000" err="1">
+                <a:ea typeface="+mn-lt"/>
+                <a:cs typeface="+mn-lt"/>
+              </a:rPr>
               <a:t>footer</a:t>
             </a:r>
             <a:r>
-              <a:rPr lang="nl-BE" sz="2000" dirty="0"/>
-              <a:t>. Vervolgens hebben we de eerste stappen gezet in het uitwerken van de indexpagina.</a:t>
-            </a:r>
+              <a:rPr lang="nl-BE" sz="2000" dirty="0">
+                <a:ea typeface="+mn-lt"/>
+                <a:cs typeface="+mn-lt"/>
+              </a:rPr>
+              <a:t>.</a:t>
+            </a:r>
+            <a:endParaRPr lang="nl-BE">
+              <a:ea typeface="+mn-lt"/>
+              <a:cs typeface="+mn-lt"/>
+            </a:endParaRPr>
+          </a:p>
+          <a:p>
+            <a:pPr>
+              <a:buFont typeface="Arial"/>
+              <a:buChar char="•"/>
+            </a:pPr>
+            <a:r>
+              <a:rPr lang="nl-BE" sz="2000" dirty="0">
+                <a:ea typeface="+mn-lt"/>
+                <a:cs typeface="+mn-lt"/>
+              </a:rPr>
+              <a:t>Eerste stappen uitwerking van de indexpagina.</a:t>
+            </a:r>
+            <a:endParaRPr lang="nl-BE" i="1" u="sng" dirty="0">
+              <a:ea typeface="+mn-lt"/>
+              <a:cs typeface="+mn-lt"/>
+            </a:endParaRPr>
+          </a:p>
+          <a:p>
+            <a:pPr>
+              <a:buFont typeface="Arial"/>
+              <a:buChar char="•"/>
+            </a:pPr>
+            <a:endParaRPr lang="nl-BE" sz="2000" dirty="0"/>
           </a:p>
         </p:txBody>
       </p:sp>
@@ -4292,46 +4720,111 @@
           </a:bodyPr>
           <a:lstStyle/>
           <a:p>
+            <a:pPr>
+              <a:buFont typeface="Arial"/>
+              <a:buChar char="•"/>
+            </a:pPr>
+            <a:r>
+              <a:rPr lang="nl-BE" sz="2000" dirty="0">
+                <a:ea typeface="+mn-lt"/>
+                <a:cs typeface="+mn-lt"/>
+              </a:rPr>
+              <a:t>Zaterdag: grote vooruitgang aan het project.</a:t>
+            </a:r>
+            <a:endParaRPr lang="en-US">
+              <a:ea typeface="+mn-lt"/>
+              <a:cs typeface="+mn-lt"/>
+            </a:endParaRPr>
+          </a:p>
+          <a:p>
+            <a:pPr>
+              <a:buFont typeface="Arial"/>
+              <a:buChar char="•"/>
+            </a:pPr>
+            <a:r>
+              <a:rPr lang="nl-BE" sz="2000" dirty="0">
+                <a:ea typeface="+mn-lt"/>
+                <a:cs typeface="+mn-lt"/>
+              </a:rPr>
+              <a:t>Indexpagina verder uitwerken en finetunen.</a:t>
+            </a:r>
+            <a:endParaRPr lang="nl-BE">
+              <a:ea typeface="+mn-lt"/>
+              <a:cs typeface="+mn-lt"/>
+            </a:endParaRPr>
+          </a:p>
+          <a:p>
+            <a:pPr>
+              <a:buFont typeface="Arial"/>
+              <a:buChar char="•"/>
+            </a:pPr>
+            <a:r>
+              <a:rPr lang="nl-BE" sz="2000" dirty="0">
+                <a:ea typeface="+mn-lt"/>
+                <a:cs typeface="+mn-lt"/>
+              </a:rPr>
+              <a:t>Contactpagina bijna klaar, enkel styling en validatie ontbreken.</a:t>
+            </a:r>
+          </a:p>
+          <a:p>
             <a:pPr marL="0" indent="0">
               <a:buNone/>
             </a:pPr>
-            <a:r>
-              <a:rPr lang="nl-BE" sz="2000" b="1" dirty="0"/>
-              <a:t>Tijdens het weekend hebben we belangrijke vooruitgang geboekt aan ons project.</a:t>
-            </a:r>
-            <a:br>
-              <a:rPr lang="nl-BE" sz="2000" dirty="0"/>
-            </a:br>
-            <a:r>
-              <a:rPr lang="nl-BE" sz="2000" dirty="0"/>
-              <a:t>Op zaterdag hebben we verder gewerkt aan de indexpagina. We hadden eerder al een goede basis gelegd, dus konden we die dag vooral focussen op het verder uitwerken en finetunen van de inhoud en de styling. Tegen het einde van de werkdag was de indexpagina volledig afgewerkt. Ondertussen werkte een ander groepslid aan de contactpagina, die aan het einde van de dag bijna klaar was. Er ontbraken enkel nog enkele stijlverbeteringen en de </a:t>
-            </a:r>
-            <a:r>
-              <a:rPr lang="nl-BE" sz="2000" dirty="0" err="1"/>
-              <a:t>JavaScript</a:t>
-            </a:r>
-            <a:r>
-              <a:rPr lang="nl-BE" sz="2000" dirty="0"/>
-              <a:t>-validatie.</a:t>
-            </a:r>
-          </a:p>
-          <a:p>
-            <a:pPr marL="0" indent="0">
-              <a:buNone/>
+            <a:endParaRPr lang="nl-BE" sz="2000" dirty="0">
+              <a:ea typeface="+mn-lt"/>
+              <a:cs typeface="+mn-lt"/>
+            </a:endParaRPr>
+          </a:p>
+          <a:p>
+            <a:pPr>
+              <a:buFont typeface="Arial"/>
+              <a:buChar char="•"/>
             </a:pPr>
             <a:r>
-              <a:rPr lang="nl-BE" sz="2000" dirty="0"/>
-              <a:t>Op zondag hebben we de HTML- en CSS-structuur van de contactpagina volledig afgerond. Daarnaast zijn we begonnen aan het opzetten van het registratieformulier, zodat we alvast een eerste basis hadden voor de volgende werkdag.</a:t>
-            </a:r>
-          </a:p>
-          <a:p>
-            <a:pPr marL="0" indent="0">
-              <a:buNone/>
+              <a:rPr lang="nl-BE" sz="2000" dirty="0">
+                <a:ea typeface="+mn-lt"/>
+                <a:cs typeface="+mn-lt"/>
+              </a:rPr>
+              <a:t>Zondag: HTML- en CSS-structuur van de contactpagina afronden.</a:t>
+            </a:r>
+            <a:endParaRPr lang="nl-BE">
+              <a:ea typeface="+mn-lt"/>
+              <a:cs typeface="+mn-lt"/>
+            </a:endParaRPr>
+          </a:p>
+          <a:p>
+            <a:pPr>
+              <a:buFont typeface="Arial"/>
+              <a:buChar char="•"/>
             </a:pPr>
             <a:r>
-              <a:rPr lang="nl-BE" sz="2000" dirty="0"/>
-              <a:t>Hoewel we in het weekend stevig hebben doorgewerkt, hebben we gelukkig ook nog tijd gevonden om te ontspannen en even te genieten.</a:t>
-            </a:r>
+              <a:rPr lang="nl-BE" sz="2000" dirty="0">
+                <a:ea typeface="+mn-lt"/>
+                <a:cs typeface="+mn-lt"/>
+              </a:rPr>
+              <a:t>Start met het opzetten van het registratieformulier.</a:t>
+            </a:r>
+            <a:endParaRPr lang="nl-BE">
+              <a:ea typeface="+mn-lt"/>
+              <a:cs typeface="+mn-lt"/>
+            </a:endParaRPr>
+          </a:p>
+          <a:p>
+            <a:pPr>
+              <a:buFont typeface="Arial"/>
+              <a:buChar char="•"/>
+            </a:pPr>
+            <a:r>
+              <a:rPr lang="nl-BE" sz="2000" dirty="0">
+                <a:ea typeface="+mn-lt"/>
+                <a:cs typeface="+mn-lt"/>
+              </a:rPr>
+              <a:t>Tussendoor ook tijd voor ontspanning.</a:t>
+            </a:r>
+            <a:endParaRPr lang="nl-BE">
+              <a:ea typeface="+mn-lt"/>
+              <a:cs typeface="+mn-lt"/>
+            </a:endParaRPr>
           </a:p>
           <a:p>
             <a:pPr marL="0" indent="0">
@@ -4435,36 +4928,95 @@
           </a:bodyPr>
           <a:lstStyle/>
           <a:p>
+            <a:pPr>
+              <a:buFont typeface="Arial"/>
+              <a:buChar char="•"/>
+            </a:pPr>
+            <a:r>
+              <a:rPr lang="nl-BE" sz="2000" dirty="0">
+                <a:ea typeface="+mn-lt"/>
+                <a:cs typeface="+mn-lt"/>
+              </a:rPr>
+              <a:t>Start met de validatie van het contactformulier.</a:t>
+            </a:r>
+            <a:endParaRPr lang="en-US">
+              <a:ea typeface="+mn-lt"/>
+              <a:cs typeface="+mn-lt"/>
+            </a:endParaRPr>
+          </a:p>
+          <a:p>
+            <a:pPr>
+              <a:buFont typeface="Arial"/>
+              <a:buChar char="•"/>
+            </a:pPr>
+            <a:r>
+              <a:rPr lang="nl-BE" sz="2000" dirty="0">
+                <a:ea typeface="+mn-lt"/>
+                <a:cs typeface="+mn-lt"/>
+              </a:rPr>
+              <a:t>Start van het registratieformulier.</a:t>
+            </a:r>
+            <a:endParaRPr lang="nl-BE">
+              <a:ea typeface="+mn-lt"/>
+              <a:cs typeface="+mn-lt"/>
+            </a:endParaRPr>
+          </a:p>
+          <a:p>
+            <a:pPr>
+              <a:buFont typeface="Arial"/>
+              <a:buChar char="•"/>
+            </a:pPr>
+            <a:r>
+              <a:rPr lang="nl-BE" sz="2000" dirty="0">
+                <a:ea typeface="+mn-lt"/>
+                <a:cs typeface="+mn-lt"/>
+              </a:rPr>
+              <a:t>Dankzij taakverdeling werken we efficiënt.</a:t>
+            </a:r>
+            <a:endParaRPr lang="nl-BE">
+              <a:ea typeface="+mn-lt"/>
+              <a:cs typeface="+mn-lt"/>
+            </a:endParaRPr>
+          </a:p>
+          <a:p>
+            <a:pPr>
+              <a:buFont typeface="Arial"/>
+              <a:buChar char="•"/>
+            </a:pPr>
+            <a:r>
+              <a:rPr lang="nl-BE" sz="2000" dirty="0">
+                <a:ea typeface="+mn-lt"/>
+                <a:cs typeface="+mn-lt"/>
+              </a:rPr>
+              <a:t>Aan het einde van de dag is het contactformulier volledig werkend en gevalideerd.</a:t>
+            </a:r>
+            <a:endParaRPr lang="nl-BE">
+              <a:ea typeface="+mn-lt"/>
+              <a:cs typeface="+mn-lt"/>
+            </a:endParaRPr>
+          </a:p>
+          <a:p>
+            <a:pPr>
+              <a:buFont typeface="Arial"/>
+              <a:buChar char="•"/>
+            </a:pPr>
+            <a:r>
+              <a:rPr lang="nl-BE" sz="2000" dirty="0">
+                <a:ea typeface="+mn-lt"/>
+                <a:cs typeface="+mn-lt"/>
+              </a:rPr>
+              <a:t>Het registratieformulier krijgt een sterke visuele structuur.</a:t>
+            </a:r>
+            <a:endParaRPr lang="nl-BE">
+              <a:ea typeface="+mn-lt"/>
+              <a:cs typeface="+mn-lt"/>
+            </a:endParaRPr>
+          </a:p>
+          <a:p>
             <a:pPr marL="0" indent="0">
               <a:buNone/>
             </a:pPr>
-            <a:r>
-              <a:rPr lang="nl-BE" sz="2000" dirty="0"/>
-              <a:t>Op maandag zijn we gestart met het valideren van het contactformulier. Terwijl één deel van de groep zich bezig hield met de </a:t>
-            </a:r>
-            <a:r>
-              <a:rPr lang="nl-BE" sz="2000" dirty="0" err="1"/>
-              <a:t>JavaScript</a:t>
-            </a:r>
-            <a:r>
-              <a:rPr lang="nl-BE" sz="2000" dirty="0"/>
-              <a:t>-validatie, werkte de rest verder aan de HTML- en CSS-structuur van het registratieformulier. Door deze taakverdeling konden we efficiënt doorwerken.</a:t>
-            </a:r>
-          </a:p>
-          <a:p>
-            <a:pPr marL="0" indent="0">
-              <a:buNone/>
-            </a:pPr>
-            <a:r>
-              <a:rPr lang="nl-BE" sz="2000" dirty="0"/>
-              <a:t>Tegen het einde van de werkdag hadden we een volledig werkend en gevalideerd contactformulier. Daarnaast stond ook het registratieformulier er al visueel sterk op, met een verzorgde lay-out en een duidelijke structuur.</a:t>
-            </a:r>
-          </a:p>
-          <a:p>
-            <a:pPr marL="0" indent="0">
-              <a:buNone/>
-            </a:pPr>
-            <a:endParaRPr lang="nl-BE" sz="2000" dirty="0"/>
+            <a:endParaRPr lang="nl-BE" sz="2000" i="1" dirty="0"/>
           </a:p>
         </p:txBody>
       </p:sp>
@@ -4924,43 +5476,74 @@
             <a:pPr marL="0" indent="0">
               <a:buNone/>
             </a:pPr>
-            <a:r>
-              <a:rPr lang="nl-BE" sz="2000" dirty="0"/>
-              <a:t>Op dinsdag zijn we met z’n tweeën verdergegaan aan het project. Eén van ons begon met het uitwerken van de pagina </a:t>
-            </a:r>
-            <a:r>
-              <a:rPr lang="nl-BE" sz="2000" b="1" dirty="0"/>
-              <a:t>‘Onze Keuken’</a:t>
-            </a:r>
-            <a:r>
-              <a:rPr lang="nl-BE" sz="2000" dirty="0"/>
-              <a:t>, waarbij vooral werd gewerkt aan de inhoud en de visuele opbouw. De andere persoon waagde zich aan het </a:t>
-            </a:r>
-            <a:r>
-              <a:rPr lang="nl-BE" sz="2000" dirty="0" err="1"/>
+            <a:endParaRPr lang="nl-BE" sz="2000" dirty="0"/>
+          </a:p>
+          <a:p>
+            <a:pPr>
+              <a:buFont typeface="Arial"/>
+              <a:buChar char="•"/>
+            </a:pPr>
+            <a:r>
+              <a:rPr lang="nl-BE" sz="2000" dirty="0">
+                <a:ea typeface="+mn-lt"/>
+                <a:cs typeface="+mn-lt"/>
+              </a:rPr>
+              <a:t>Uitwerken van de ‘Onze Keuken’-pagina: inhoud en visuele opbouw.</a:t>
+            </a:r>
+            <a:endParaRPr lang="nl-BE">
+              <a:ea typeface="+mn-lt"/>
+              <a:cs typeface="+mn-lt"/>
+            </a:endParaRPr>
+          </a:p>
+          <a:p>
+            <a:pPr>
+              <a:buFont typeface="Arial"/>
+              <a:buChar char="•"/>
+            </a:pPr>
+            <a:r>
+              <a:rPr lang="nl-BE" sz="2000" dirty="0" err="1">
+                <a:ea typeface="+mn-lt"/>
+                <a:cs typeface="+mn-lt"/>
+              </a:rPr>
               <a:t>JavaScript</a:t>
             </a:r>
             <a:r>
-              <a:rPr lang="nl-BE" sz="2000" dirty="0"/>
-              <a:t>-avontuur voor het reserveringsformulier, een taak die wat meer tijd en logica vereiste.</a:t>
-            </a:r>
+              <a:rPr lang="nl-BE" sz="2000" dirty="0">
+                <a:ea typeface="+mn-lt"/>
+                <a:cs typeface="+mn-lt"/>
+              </a:rPr>
+              <a:t> voor het reserveringsformulier starten.</a:t>
+            </a:r>
+            <a:endParaRPr lang="nl-BE">
+              <a:ea typeface="+mn-lt"/>
+              <a:cs typeface="+mn-lt"/>
+            </a:endParaRPr>
+          </a:p>
+          <a:p>
+            <a:pPr>
+              <a:buFont typeface="Arial"/>
+              <a:buChar char="•"/>
+            </a:pPr>
+            <a:r>
+              <a:rPr lang="nl-BE" sz="2000" dirty="0">
+                <a:ea typeface="+mn-lt"/>
+                <a:cs typeface="+mn-lt"/>
+              </a:rPr>
+              <a:t>Duidelijke vooruitgang geboekt.</a:t>
+            </a:r>
+            <a:endParaRPr lang="nl-BE">
+              <a:ea typeface="+mn-lt"/>
+              <a:cs typeface="+mn-lt"/>
+            </a:endParaRPr>
           </a:p>
           <a:p>
             <a:pPr marL="0" indent="0">
               <a:buNone/>
             </a:pPr>
-            <a:r>
-              <a:rPr lang="nl-BE" sz="2000" dirty="0"/>
-              <a:t>Aan het einde van de dag hadden we allebei duidelijke vooruitgang geboekt. Dankzij deze stappen konden we de volgende dag met een frisse start en een duidelijke richting </a:t>
-            </a:r>
-            <a:r>
-              <a:rPr lang="nl-BE" sz="2000" dirty="0" err="1"/>
-              <a:t>verderwerken</a:t>
-            </a:r>
-            <a:r>
-              <a:rPr lang="nl-BE" sz="2000" dirty="0"/>
-              <a:t> aan het project.</a:t>
-            </a:r>
+            <a:endParaRPr lang="nl-BE" sz="2000" dirty="0">
+              <a:ea typeface="+mn-lt"/>
+              <a:cs typeface="+mn-lt"/>
+            </a:endParaRPr>
           </a:p>
           <a:p>
             <a:pPr marL="0" indent="0">
@@ -5180,45 +5763,99 @@
           </a:bodyPr>
           <a:lstStyle/>
           <a:p>
+            <a:pPr>
+              <a:buFont typeface="Arial"/>
+              <a:buChar char="•"/>
+            </a:pPr>
+            <a:r>
+              <a:rPr lang="nl-BE" sz="2000" dirty="0">
+                <a:ea typeface="+mn-lt"/>
+                <a:cs typeface="+mn-lt"/>
+              </a:rPr>
+              <a:t>Woensdag: ‘Onze Keuken’-pagina volledig afgewerkt.</a:t>
+            </a:r>
+            <a:endParaRPr lang="en-US">
+              <a:ea typeface="+mn-lt"/>
+              <a:cs typeface="+mn-lt"/>
+            </a:endParaRPr>
+          </a:p>
+          <a:p>
+            <a:pPr>
+              <a:buFont typeface="Arial"/>
+              <a:buChar char="•"/>
+            </a:pPr>
+            <a:r>
+              <a:rPr lang="nl-BE" sz="2000" dirty="0">
+                <a:ea typeface="+mn-lt"/>
+                <a:cs typeface="+mn-lt"/>
+              </a:rPr>
+              <a:t>Lay-out en inhoud compleet uitgewerkt.</a:t>
+            </a:r>
+            <a:endParaRPr lang="nl-BE">
+              <a:ea typeface="+mn-lt"/>
+              <a:cs typeface="+mn-lt"/>
+            </a:endParaRPr>
+          </a:p>
+          <a:p>
+            <a:pPr>
+              <a:buFont typeface="Arial"/>
+              <a:buChar char="•"/>
+            </a:pPr>
+            <a:r>
+              <a:rPr lang="nl-BE" sz="2000" dirty="0">
+                <a:ea typeface="+mn-lt"/>
+                <a:cs typeface="+mn-lt"/>
+              </a:rPr>
+              <a:t>Fout ontdekt in het contactformulier.</a:t>
+            </a:r>
+            <a:endParaRPr lang="nl-BE">
+              <a:ea typeface="+mn-lt"/>
+              <a:cs typeface="+mn-lt"/>
+            </a:endParaRPr>
+          </a:p>
+          <a:p>
+            <a:pPr>
+              <a:buFont typeface="Arial"/>
+              <a:buChar char="•"/>
+            </a:pPr>
+            <a:r>
+              <a:rPr lang="nl-BE" sz="2000" dirty="0" err="1">
+                <a:ea typeface="+mn-lt"/>
+                <a:cs typeface="+mn-lt"/>
+              </a:rPr>
+              <a:t>JavaScript</a:t>
+            </a:r>
+            <a:r>
+              <a:rPr lang="nl-BE" sz="2000" dirty="0">
+                <a:ea typeface="+mn-lt"/>
+                <a:cs typeface="+mn-lt"/>
+              </a:rPr>
+              <a:t> voor het reserveringsformulier volledig herschreven.</a:t>
+            </a:r>
+            <a:endParaRPr lang="nl-BE" dirty="0"/>
+          </a:p>
+          <a:p>
+            <a:pPr>
+              <a:buFont typeface="Arial"/>
+              <a:buChar char="•"/>
+            </a:pPr>
+            <a:r>
+              <a:rPr lang="nl-BE" sz="2000" dirty="0">
+                <a:ea typeface="+mn-lt"/>
+                <a:cs typeface="+mn-lt"/>
+              </a:rPr>
+              <a:t>Validatie nu correct en overzichtelijk.</a:t>
+            </a:r>
+            <a:endParaRPr lang="nl-BE">
+              <a:ea typeface="+mn-lt"/>
+              <a:cs typeface="+mn-lt"/>
+            </a:endParaRPr>
+          </a:p>
+          <a:p>
             <a:pPr marL="0" indent="0">
               <a:buNone/>
             </a:pPr>
-            <a:r>
-              <a:rPr lang="nl-BE" sz="2000" dirty="0"/>
-              <a:t>Op woensdag hebben we de pagina </a:t>
-            </a:r>
-            <a:r>
-              <a:rPr lang="nl-BE" sz="2000" b="1" dirty="0"/>
-              <a:t>‘Onze Keuken’</a:t>
-            </a:r>
-            <a:r>
-              <a:rPr lang="nl-BE" sz="2000" dirty="0"/>
-              <a:t> volledig afgerond. Alles was netjes opgebouwd en de lay-out en inhoud waren compleet uitgewerkt. Daarnaast merkten we dat er een foutje zat in het </a:t>
-            </a:r>
-            <a:r>
-              <a:rPr lang="nl-BE" sz="2000" b="1" dirty="0"/>
-              <a:t>contactformulier</a:t>
-            </a:r>
-            <a:r>
-              <a:rPr lang="nl-BE" sz="2000" dirty="0"/>
-              <a:t>: iemand had in de bestaande functie van het contactformulier </a:t>
-            </a:r>
-            <a:r>
-              <a:rPr lang="nl-BE" sz="2000" dirty="0" err="1"/>
-              <a:t>verdergewerkt</a:t>
-            </a:r>
-            <a:r>
-              <a:rPr lang="nl-BE" sz="2000" dirty="0"/>
-              <a:t>, in de veronderstelling dat deze ook voor het reserveringsformulier zou werken. Dit bleek echter een foute keuze. Daarom hebben we besloten om de </a:t>
-            </a:r>
-            <a:r>
-              <a:rPr lang="nl-BE" sz="2000" dirty="0" err="1"/>
-              <a:t>JavaScript</a:t>
-            </a:r>
-            <a:r>
-              <a:rPr lang="nl-BE" sz="2000" dirty="0"/>
-              <a:t> voor het reserveringsformulier volledig opnieuw te schrijven, zodat de validatie correct en overzichtelijk werd geïmplementeerd.</a:t>
-            </a:r>
+            <a:endParaRPr lang="nl-BE" sz="2000" dirty="0"/>
           </a:p>
         </p:txBody>
       </p:sp>
@@ -5467,22 +6104,98 @@
         <p:spPr>
           <a:xfrm>
             <a:off x="838200" y="1825625"/>
-            <a:ext cx="10515600" cy="1222375"/>
+            <a:ext cx="5640754" cy="3684221"/>
           </a:xfrm>
         </p:spPr>
         <p:txBody>
-          <a:bodyPr>
+          <a:bodyPr vert="horz" lIns="91440" tIns="45720" rIns="91440" bIns="45720" rtlCol="0" anchor="ctr">
             <a:normAutofit/>
           </a:bodyPr>
           <a:lstStyle/>
           <a:p>
+            <a:pPr>
+              <a:buFont typeface="Arial"/>
+              <a:buChar char="•"/>
+            </a:pPr>
+            <a:r>
+              <a:rPr lang="nl-BE" sz="2000" dirty="0">
+                <a:ea typeface="+mn-lt"/>
+                <a:cs typeface="+mn-lt"/>
+              </a:rPr>
+              <a:t>Donderdag: laatste testen en verbeteringen uitvoeren.</a:t>
+            </a:r>
+            <a:endParaRPr lang="en-US">
+              <a:ea typeface="+mn-lt"/>
+              <a:cs typeface="+mn-lt"/>
+            </a:endParaRPr>
+          </a:p>
+          <a:p>
+            <a:pPr>
+              <a:buFont typeface="Arial"/>
+              <a:buChar char="•"/>
+            </a:pPr>
+            <a:r>
+              <a:rPr lang="nl-BE" sz="2000" dirty="0">
+                <a:ea typeface="+mn-lt"/>
+                <a:cs typeface="+mn-lt"/>
+              </a:rPr>
+              <a:t>Zorgen dat alles correct werkt.</a:t>
+            </a:r>
+            <a:endParaRPr lang="nl-BE"/>
+          </a:p>
+          <a:p>
+            <a:pPr>
+              <a:buFont typeface="Arial"/>
+              <a:buChar char="•"/>
+            </a:pPr>
+            <a:r>
+              <a:rPr lang="nl-BE" sz="2000" dirty="0">
+                <a:ea typeface="+mn-lt"/>
+                <a:cs typeface="+mn-lt"/>
+              </a:rPr>
+              <a:t>Website online zetten.</a:t>
+            </a:r>
+            <a:endParaRPr lang="nl-BE"/>
+          </a:p>
+          <a:p>
+            <a:pPr>
+              <a:buFont typeface="Arial"/>
+              <a:buChar char="•"/>
+            </a:pPr>
+            <a:r>
+              <a:rPr lang="nl-BE" sz="2000" dirty="0">
+                <a:ea typeface="+mn-lt"/>
+                <a:cs typeface="+mn-lt"/>
+              </a:rPr>
+              <a:t>Presentatie starten en afronden.</a:t>
+            </a:r>
+            <a:endParaRPr lang="nl-BE">
+              <a:ea typeface="+mn-lt"/>
+              <a:cs typeface="+mn-lt"/>
+            </a:endParaRPr>
+          </a:p>
+          <a:p>
+            <a:pPr>
+              <a:buFont typeface="Arial"/>
+              <a:buChar char="•"/>
+            </a:pPr>
+            <a:r>
+              <a:rPr lang="nl-BE" sz="2000" dirty="0">
+                <a:ea typeface="+mn-lt"/>
+                <a:cs typeface="+mn-lt"/>
+              </a:rPr>
+              <a:t>Website volledig klaar voor gebruik.</a:t>
+            </a:r>
+            <a:endParaRPr lang="nl-BE">
+              <a:ea typeface="+mn-lt"/>
+              <a:cs typeface="+mn-lt"/>
+            </a:endParaRPr>
+          </a:p>
+          <a:p>
             <a:pPr marL="0" indent="0">
               <a:buNone/>
             </a:pPr>
-            <a:r>
-              <a:rPr lang="nl-BE" sz="2000" dirty="0"/>
-              <a:t>Op donderdag zijn we opnieuw op school samengekomen om de laatste testen en verbeteringen aan onze website door te voeren. We hebben ervoor gezorgd dat alles correct werkte, de website online gezet en de voorbereidingen voor onze presentatie afgerond. Dankzij deze laatste inspanningen is de website nu volledig klaar voor gebruik.</a:t>
-            </a:r>
+            <a:endParaRPr lang="nl-BE" sz="2000" dirty="0"/>
           </a:p>
         </p:txBody>
       </p:sp>
@@ -5514,8 +6227,8 @@
         </p:blipFill>
         <p:spPr>
           <a:xfrm>
-            <a:off x="2960914" y="3182937"/>
-            <a:ext cx="6095998" cy="3402418"/>
+            <a:off x="6223838" y="2059475"/>
+            <a:ext cx="5539153" cy="3763880"/>
           </a:xfrm>
           <a:prstGeom prst="rect">
             <a:avLst/>

</xml_diff>